<commit_message>
Updated the gibc 2k21 presentation
</commit_message>
<xml_diff>
--- a/2021/Automating Logic Apps Deployment With GitHUB Actions.pptx
+++ b/2021/Automating Logic Apps Deployment With GitHUB Actions.pptx
@@ -4,6 +4,9 @@
   <p:sldMasterIdLst>
     <p:sldMasterId id="2147483648" r:id="rId1"/>
   </p:sldMasterIdLst>
+  <p:notesMasterIdLst>
+    <p:notesMasterId r:id="rId12"/>
+  </p:notesMasterIdLst>
   <p:sldIdLst>
     <p:sldId id="256" r:id="rId2"/>
     <p:sldId id="258" r:id="rId3"/>
@@ -121,6 +124,995 @@
 </p:presentation>
 </file>
 
+<file path=ppt/notesMasters/notesMaster1.xml><?xml version="1.0" encoding="utf-8"?>
+<p:notesMaster xmlns:a="http://schemas.openxmlformats.org/drawingml/2006/main" xmlns:r="http://schemas.openxmlformats.org/officeDocument/2006/relationships" xmlns:p="http://schemas.openxmlformats.org/presentationml/2006/main">
+  <p:cSld>
+    <p:bg>
+      <p:bgRef idx="1001">
+        <a:schemeClr val="bg1"/>
+      </p:bgRef>
+    </p:bg>
+    <p:spTree>
+      <p:nvGrpSpPr>
+        <p:cNvPr id="1" name=""/>
+        <p:cNvGrpSpPr/>
+        <p:nvPr/>
+      </p:nvGrpSpPr>
+      <p:grpSpPr>
+        <a:xfrm>
+          <a:off x="0" y="0"/>
+          <a:ext cx="0" cy="0"/>
+          <a:chOff x="0" y="0"/>
+          <a:chExt cx="0" cy="0"/>
+        </a:xfrm>
+      </p:grpSpPr>
+      <p:sp>
+        <p:nvSpPr>
+          <p:cNvPr id="2" name="Header Placeholder 1"/>
+          <p:cNvSpPr>
+            <a:spLocks noGrp="1"/>
+          </p:cNvSpPr>
+          <p:nvPr>
+            <p:ph type="hdr" sz="quarter"/>
+          </p:nvPr>
+        </p:nvSpPr>
+        <p:spPr>
+          <a:xfrm>
+            <a:off x="0" y="0"/>
+            <a:ext cx="2971800" cy="458788"/>
+          </a:xfrm>
+          <a:prstGeom prst="rect">
+            <a:avLst/>
+          </a:prstGeom>
+        </p:spPr>
+        <p:txBody>
+          <a:bodyPr vert="horz" lIns="91440" tIns="45720" rIns="91440" bIns="45720" rtlCol="0"/>
+          <a:lstStyle>
+            <a:lvl1pPr algn="l">
+              <a:defRPr sz="1200"/>
+            </a:lvl1pPr>
+          </a:lstStyle>
+          <a:p>
+            <a:endParaRPr lang="en-IN"/>
+          </a:p>
+        </p:txBody>
+      </p:sp>
+      <p:sp>
+        <p:nvSpPr>
+          <p:cNvPr id="3" name="Date Placeholder 2"/>
+          <p:cNvSpPr>
+            <a:spLocks noGrp="1"/>
+          </p:cNvSpPr>
+          <p:nvPr>
+            <p:ph type="dt" idx="1"/>
+          </p:nvPr>
+        </p:nvSpPr>
+        <p:spPr>
+          <a:xfrm>
+            <a:off x="3884613" y="0"/>
+            <a:ext cx="2971800" cy="458788"/>
+          </a:xfrm>
+          <a:prstGeom prst="rect">
+            <a:avLst/>
+          </a:prstGeom>
+        </p:spPr>
+        <p:txBody>
+          <a:bodyPr vert="horz" lIns="91440" tIns="45720" rIns="91440" bIns="45720" rtlCol="0"/>
+          <a:lstStyle>
+            <a:lvl1pPr algn="r">
+              <a:defRPr sz="1200"/>
+            </a:lvl1pPr>
+          </a:lstStyle>
+          <a:p>
+            <a:fld id="{753C8B79-7F5B-4943-AEB5-7A52F0AE9F2E}" type="datetimeFigureOut">
+              <a:rPr lang="en-IN" smtClean="0"/>
+              <a:t>26-02-2021</a:t>
+            </a:fld>
+            <a:endParaRPr lang="en-IN"/>
+          </a:p>
+        </p:txBody>
+      </p:sp>
+      <p:sp>
+        <p:nvSpPr>
+          <p:cNvPr id="4" name="Slide Image Placeholder 3"/>
+          <p:cNvSpPr>
+            <a:spLocks noGrp="1" noRot="1" noChangeAspect="1"/>
+          </p:cNvSpPr>
+          <p:nvPr>
+            <p:ph type="sldImg" idx="2"/>
+          </p:nvPr>
+        </p:nvSpPr>
+        <p:spPr>
+          <a:xfrm>
+            <a:off x="685800" y="1143000"/>
+            <a:ext cx="5486400" cy="3086100"/>
+          </a:xfrm>
+          <a:prstGeom prst="rect">
+            <a:avLst/>
+          </a:prstGeom>
+          <a:noFill/>
+          <a:ln w="12700">
+            <a:solidFill>
+              <a:prstClr val="black"/>
+            </a:solidFill>
+          </a:ln>
+        </p:spPr>
+        <p:txBody>
+          <a:bodyPr vert="horz" lIns="91440" tIns="45720" rIns="91440" bIns="45720" rtlCol="0" anchor="ctr"/>
+          <a:lstStyle/>
+          <a:p>
+            <a:endParaRPr lang="en-IN"/>
+          </a:p>
+        </p:txBody>
+      </p:sp>
+      <p:sp>
+        <p:nvSpPr>
+          <p:cNvPr id="5" name="Notes Placeholder 4"/>
+          <p:cNvSpPr>
+            <a:spLocks noGrp="1"/>
+          </p:cNvSpPr>
+          <p:nvPr>
+            <p:ph type="body" sz="quarter" idx="3"/>
+          </p:nvPr>
+        </p:nvSpPr>
+        <p:spPr>
+          <a:xfrm>
+            <a:off x="685800" y="4400550"/>
+            <a:ext cx="5486400" cy="3600450"/>
+          </a:xfrm>
+          <a:prstGeom prst="rect">
+            <a:avLst/>
+          </a:prstGeom>
+        </p:spPr>
+        <p:txBody>
+          <a:bodyPr vert="horz" lIns="91440" tIns="45720" rIns="91440" bIns="45720" rtlCol="0"/>
+          <a:lstStyle/>
+          <a:p>
+            <a:pPr lvl="0"/>
+            <a:r>
+              <a:rPr lang="en-US"/>
+              <a:t>Click to edit Master text styles</a:t>
+            </a:r>
+          </a:p>
+          <a:p>
+            <a:pPr lvl="1"/>
+            <a:r>
+              <a:rPr lang="en-US"/>
+              <a:t>Second level</a:t>
+            </a:r>
+          </a:p>
+          <a:p>
+            <a:pPr lvl="2"/>
+            <a:r>
+              <a:rPr lang="en-US"/>
+              <a:t>Third level</a:t>
+            </a:r>
+          </a:p>
+          <a:p>
+            <a:pPr lvl="3"/>
+            <a:r>
+              <a:rPr lang="en-US"/>
+              <a:t>Fourth level</a:t>
+            </a:r>
+          </a:p>
+          <a:p>
+            <a:pPr lvl="4"/>
+            <a:r>
+              <a:rPr lang="en-US"/>
+              <a:t>Fifth level</a:t>
+            </a:r>
+            <a:endParaRPr lang="en-IN"/>
+          </a:p>
+        </p:txBody>
+      </p:sp>
+      <p:sp>
+        <p:nvSpPr>
+          <p:cNvPr id="6" name="Footer Placeholder 5"/>
+          <p:cNvSpPr>
+            <a:spLocks noGrp="1"/>
+          </p:cNvSpPr>
+          <p:nvPr>
+            <p:ph type="ftr" sz="quarter" idx="4"/>
+          </p:nvPr>
+        </p:nvSpPr>
+        <p:spPr>
+          <a:xfrm>
+            <a:off x="0" y="8685213"/>
+            <a:ext cx="2971800" cy="458787"/>
+          </a:xfrm>
+          <a:prstGeom prst="rect">
+            <a:avLst/>
+          </a:prstGeom>
+        </p:spPr>
+        <p:txBody>
+          <a:bodyPr vert="horz" lIns="91440" tIns="45720" rIns="91440" bIns="45720" rtlCol="0" anchor="b"/>
+          <a:lstStyle>
+            <a:lvl1pPr algn="l">
+              <a:defRPr sz="1200"/>
+            </a:lvl1pPr>
+          </a:lstStyle>
+          <a:p>
+            <a:endParaRPr lang="en-IN"/>
+          </a:p>
+        </p:txBody>
+      </p:sp>
+      <p:sp>
+        <p:nvSpPr>
+          <p:cNvPr id="7" name="Slide Number Placeholder 6"/>
+          <p:cNvSpPr>
+            <a:spLocks noGrp="1"/>
+          </p:cNvSpPr>
+          <p:nvPr>
+            <p:ph type="sldNum" sz="quarter" idx="5"/>
+          </p:nvPr>
+        </p:nvSpPr>
+        <p:spPr>
+          <a:xfrm>
+            <a:off x="3884613" y="8685213"/>
+            <a:ext cx="2971800" cy="458787"/>
+          </a:xfrm>
+          <a:prstGeom prst="rect">
+            <a:avLst/>
+          </a:prstGeom>
+        </p:spPr>
+        <p:txBody>
+          <a:bodyPr vert="horz" lIns="91440" tIns="45720" rIns="91440" bIns="45720" rtlCol="0" anchor="b"/>
+          <a:lstStyle>
+            <a:lvl1pPr algn="r">
+              <a:defRPr sz="1200"/>
+            </a:lvl1pPr>
+          </a:lstStyle>
+          <a:p>
+            <a:fld id="{D283D8B1-3260-4FDA-B133-ACB5BAEB9EAB}" type="slidenum">
+              <a:rPr lang="en-IN" smtClean="0"/>
+              <a:t>‹#›</a:t>
+            </a:fld>
+            <a:endParaRPr lang="en-IN"/>
+          </a:p>
+        </p:txBody>
+      </p:sp>
+    </p:spTree>
+    <p:extLst>
+      <p:ext uri="{BB962C8B-B14F-4D97-AF65-F5344CB8AC3E}">
+        <p14:creationId xmlns:p14="http://schemas.microsoft.com/office/powerpoint/2010/main" val="4223135079"/>
+      </p:ext>
+    </p:extLst>
+  </p:cSld>
+  <p:clrMap bg1="lt1" tx1="dk1" bg2="lt2" tx2="dk2" accent1="accent1" accent2="accent2" accent3="accent3" accent4="accent4" accent5="accent5" accent6="accent6" hlink="hlink" folHlink="folHlink"/>
+  <p:notesStyle>
+    <a:lvl1pPr marL="0" algn="l" defTabSz="914400" rtl="0" eaLnBrk="1" latinLnBrk="0" hangingPunct="1">
+      <a:defRPr sz="1200" kern="1200">
+        <a:solidFill>
+          <a:schemeClr val="tx1"/>
+        </a:solidFill>
+        <a:latin typeface="+mn-lt"/>
+        <a:ea typeface="+mn-ea"/>
+        <a:cs typeface="+mn-cs"/>
+      </a:defRPr>
+    </a:lvl1pPr>
+    <a:lvl2pPr marL="457200" algn="l" defTabSz="914400" rtl="0" eaLnBrk="1" latinLnBrk="0" hangingPunct="1">
+      <a:defRPr sz="1200" kern="1200">
+        <a:solidFill>
+          <a:schemeClr val="tx1"/>
+        </a:solidFill>
+        <a:latin typeface="+mn-lt"/>
+        <a:ea typeface="+mn-ea"/>
+        <a:cs typeface="+mn-cs"/>
+      </a:defRPr>
+    </a:lvl2pPr>
+    <a:lvl3pPr marL="914400" algn="l" defTabSz="914400" rtl="0" eaLnBrk="1" latinLnBrk="0" hangingPunct="1">
+      <a:defRPr sz="1200" kern="1200">
+        <a:solidFill>
+          <a:schemeClr val="tx1"/>
+        </a:solidFill>
+        <a:latin typeface="+mn-lt"/>
+        <a:ea typeface="+mn-ea"/>
+        <a:cs typeface="+mn-cs"/>
+      </a:defRPr>
+    </a:lvl3pPr>
+    <a:lvl4pPr marL="1371600" algn="l" defTabSz="914400" rtl="0" eaLnBrk="1" latinLnBrk="0" hangingPunct="1">
+      <a:defRPr sz="1200" kern="1200">
+        <a:solidFill>
+          <a:schemeClr val="tx1"/>
+        </a:solidFill>
+        <a:latin typeface="+mn-lt"/>
+        <a:ea typeface="+mn-ea"/>
+        <a:cs typeface="+mn-cs"/>
+      </a:defRPr>
+    </a:lvl4pPr>
+    <a:lvl5pPr marL="1828800" algn="l" defTabSz="914400" rtl="0" eaLnBrk="1" latinLnBrk="0" hangingPunct="1">
+      <a:defRPr sz="1200" kern="1200">
+        <a:solidFill>
+          <a:schemeClr val="tx1"/>
+        </a:solidFill>
+        <a:latin typeface="+mn-lt"/>
+        <a:ea typeface="+mn-ea"/>
+        <a:cs typeface="+mn-cs"/>
+      </a:defRPr>
+    </a:lvl5pPr>
+    <a:lvl6pPr marL="2286000" algn="l" defTabSz="914400" rtl="0" eaLnBrk="1" latinLnBrk="0" hangingPunct="1">
+      <a:defRPr sz="1200" kern="1200">
+        <a:solidFill>
+          <a:schemeClr val="tx1"/>
+        </a:solidFill>
+        <a:latin typeface="+mn-lt"/>
+        <a:ea typeface="+mn-ea"/>
+        <a:cs typeface="+mn-cs"/>
+      </a:defRPr>
+    </a:lvl6pPr>
+    <a:lvl7pPr marL="2743200" algn="l" defTabSz="914400" rtl="0" eaLnBrk="1" latinLnBrk="0" hangingPunct="1">
+      <a:defRPr sz="1200" kern="1200">
+        <a:solidFill>
+          <a:schemeClr val="tx1"/>
+        </a:solidFill>
+        <a:latin typeface="+mn-lt"/>
+        <a:ea typeface="+mn-ea"/>
+        <a:cs typeface="+mn-cs"/>
+      </a:defRPr>
+    </a:lvl7pPr>
+    <a:lvl8pPr marL="3200400" algn="l" defTabSz="914400" rtl="0" eaLnBrk="1" latinLnBrk="0" hangingPunct="1">
+      <a:defRPr sz="1200" kern="1200">
+        <a:solidFill>
+          <a:schemeClr val="tx1"/>
+        </a:solidFill>
+        <a:latin typeface="+mn-lt"/>
+        <a:ea typeface="+mn-ea"/>
+        <a:cs typeface="+mn-cs"/>
+      </a:defRPr>
+    </a:lvl8pPr>
+    <a:lvl9pPr marL="3657600" algn="l" defTabSz="914400" rtl="0" eaLnBrk="1" latinLnBrk="0" hangingPunct="1">
+      <a:defRPr sz="1200" kern="1200">
+        <a:solidFill>
+          <a:schemeClr val="tx1"/>
+        </a:solidFill>
+        <a:latin typeface="+mn-lt"/>
+        <a:ea typeface="+mn-ea"/>
+        <a:cs typeface="+mn-cs"/>
+      </a:defRPr>
+    </a:lvl9pPr>
+  </p:notesStyle>
+</p:notesMaster>
+</file>
+
+<file path=ppt/notesSlides/notesSlide1.xml><?xml version="1.0" encoding="utf-8"?>
+<p:notes xmlns:a="http://schemas.openxmlformats.org/drawingml/2006/main" xmlns:r="http://schemas.openxmlformats.org/officeDocument/2006/relationships" xmlns:p="http://schemas.openxmlformats.org/presentationml/2006/main">
+  <p:cSld>
+    <p:spTree>
+      <p:nvGrpSpPr>
+        <p:cNvPr id="1" name=""/>
+        <p:cNvGrpSpPr/>
+        <p:nvPr/>
+      </p:nvGrpSpPr>
+      <p:grpSpPr>
+        <a:xfrm>
+          <a:off x="0" y="0"/>
+          <a:ext cx="0" cy="0"/>
+          <a:chOff x="0" y="0"/>
+          <a:chExt cx="0" cy="0"/>
+        </a:xfrm>
+      </p:grpSpPr>
+      <p:sp>
+        <p:nvSpPr>
+          <p:cNvPr id="2" name="Slide Image Placeholder 1"/>
+          <p:cNvSpPr>
+            <a:spLocks noGrp="1" noRot="1" noChangeAspect="1"/>
+          </p:cNvSpPr>
+          <p:nvPr>
+            <p:ph type="sldImg"/>
+          </p:nvPr>
+        </p:nvSpPr>
+        <p:spPr/>
+      </p:sp>
+      <p:sp>
+        <p:nvSpPr>
+          <p:cNvPr id="3" name="Notes Placeholder 2"/>
+          <p:cNvSpPr>
+            <a:spLocks noGrp="1"/>
+          </p:cNvSpPr>
+          <p:nvPr>
+            <p:ph type="body" idx="1"/>
+          </p:nvPr>
+        </p:nvSpPr>
+        <p:spPr/>
+        <p:txBody>
+          <a:bodyPr/>
+          <a:lstStyle/>
+          <a:p>
+            <a:r>
+              <a:rPr lang="en-IN" dirty="0"/>
+              <a:t>Started my journey into integration with BizTalk and I currently work with Azure Integration Services and I explore </a:t>
+            </a:r>
+            <a:r>
+              <a:rPr lang="en-IN" dirty="0" err="1"/>
+              <a:t>fullstack</a:t>
+            </a:r>
+            <a:r>
+              <a:rPr lang="en-IN" dirty="0"/>
+              <a:t> development using </a:t>
+            </a:r>
+            <a:r>
+              <a:rPr lang="en-IN" dirty="0" err="1"/>
+              <a:t>Blazor</a:t>
+            </a:r>
+            <a:r>
+              <a:rPr lang="en-IN" dirty="0"/>
+              <a:t> and </a:t>
+            </a:r>
+            <a:r>
+              <a:rPr lang="en-IN" dirty="0" err="1"/>
+              <a:t>.net</a:t>
+            </a:r>
+            <a:r>
+              <a:rPr lang="en-IN" dirty="0"/>
+              <a:t> core on Side</a:t>
+            </a:r>
+          </a:p>
+          <a:p>
+            <a:endParaRPr lang="en-IN" dirty="0"/>
+          </a:p>
+        </p:txBody>
+      </p:sp>
+      <p:sp>
+        <p:nvSpPr>
+          <p:cNvPr id="4" name="Slide Number Placeholder 3"/>
+          <p:cNvSpPr>
+            <a:spLocks noGrp="1"/>
+          </p:cNvSpPr>
+          <p:nvPr>
+            <p:ph type="sldNum" sz="quarter" idx="5"/>
+          </p:nvPr>
+        </p:nvSpPr>
+        <p:spPr/>
+        <p:txBody>
+          <a:bodyPr/>
+          <a:lstStyle/>
+          <a:p>
+            <a:fld id="{D283D8B1-3260-4FDA-B133-ACB5BAEB9EAB}" type="slidenum">
+              <a:rPr lang="en-IN" smtClean="0"/>
+              <a:t>2</a:t>
+            </a:fld>
+            <a:endParaRPr lang="en-IN"/>
+          </a:p>
+        </p:txBody>
+      </p:sp>
+    </p:spTree>
+    <p:extLst>
+      <p:ext uri="{BB962C8B-B14F-4D97-AF65-F5344CB8AC3E}">
+        <p14:creationId xmlns:p14="http://schemas.microsoft.com/office/powerpoint/2010/main" val="1190861881"/>
+      </p:ext>
+    </p:extLst>
+  </p:cSld>
+  <p:clrMapOvr>
+    <a:masterClrMapping/>
+  </p:clrMapOvr>
+</p:notes>
+</file>
+
+<file path=ppt/notesSlides/notesSlide2.xml><?xml version="1.0" encoding="utf-8"?>
+<p:notes xmlns:a="http://schemas.openxmlformats.org/drawingml/2006/main" xmlns:r="http://schemas.openxmlformats.org/officeDocument/2006/relationships" xmlns:p="http://schemas.openxmlformats.org/presentationml/2006/main">
+  <p:cSld>
+    <p:spTree>
+      <p:nvGrpSpPr>
+        <p:cNvPr id="1" name=""/>
+        <p:cNvGrpSpPr/>
+        <p:nvPr/>
+      </p:nvGrpSpPr>
+      <p:grpSpPr>
+        <a:xfrm>
+          <a:off x="0" y="0"/>
+          <a:ext cx="0" cy="0"/>
+          <a:chOff x="0" y="0"/>
+          <a:chExt cx="0" cy="0"/>
+        </a:xfrm>
+      </p:grpSpPr>
+      <p:sp>
+        <p:nvSpPr>
+          <p:cNvPr id="2" name="Slide Image Placeholder 1"/>
+          <p:cNvSpPr>
+            <a:spLocks noGrp="1" noRot="1" noChangeAspect="1"/>
+          </p:cNvSpPr>
+          <p:nvPr>
+            <p:ph type="sldImg"/>
+          </p:nvPr>
+        </p:nvSpPr>
+        <p:spPr/>
+      </p:sp>
+      <p:sp>
+        <p:nvSpPr>
+          <p:cNvPr id="3" name="Notes Placeholder 2"/>
+          <p:cNvSpPr>
+            <a:spLocks noGrp="1"/>
+          </p:cNvSpPr>
+          <p:nvPr>
+            <p:ph type="body" idx="1"/>
+          </p:nvPr>
+        </p:nvSpPr>
+        <p:spPr/>
+        <p:txBody>
+          <a:bodyPr/>
+          <a:lstStyle/>
+          <a:p>
+            <a:endParaRPr lang="en-IN" dirty="0"/>
+          </a:p>
+        </p:txBody>
+      </p:sp>
+      <p:sp>
+        <p:nvSpPr>
+          <p:cNvPr id="4" name="Slide Number Placeholder 3"/>
+          <p:cNvSpPr>
+            <a:spLocks noGrp="1"/>
+          </p:cNvSpPr>
+          <p:nvPr>
+            <p:ph type="sldNum" sz="quarter" idx="5"/>
+          </p:nvPr>
+        </p:nvSpPr>
+        <p:spPr/>
+        <p:txBody>
+          <a:bodyPr/>
+          <a:lstStyle/>
+          <a:p>
+            <a:fld id="{D283D8B1-3260-4FDA-B133-ACB5BAEB9EAB}" type="slidenum">
+              <a:rPr lang="en-IN" smtClean="0"/>
+              <a:t>3</a:t>
+            </a:fld>
+            <a:endParaRPr lang="en-IN"/>
+          </a:p>
+        </p:txBody>
+      </p:sp>
+    </p:spTree>
+    <p:extLst>
+      <p:ext uri="{BB962C8B-B14F-4D97-AF65-F5344CB8AC3E}">
+        <p14:creationId xmlns:p14="http://schemas.microsoft.com/office/powerpoint/2010/main" val="2679435170"/>
+      </p:ext>
+    </p:extLst>
+  </p:cSld>
+  <p:clrMapOvr>
+    <a:masterClrMapping/>
+  </p:clrMapOvr>
+</p:notes>
+</file>
+
+<file path=ppt/notesSlides/notesSlide3.xml><?xml version="1.0" encoding="utf-8"?>
+<p:notes xmlns:a="http://schemas.openxmlformats.org/drawingml/2006/main" xmlns:r="http://schemas.openxmlformats.org/officeDocument/2006/relationships" xmlns:p="http://schemas.openxmlformats.org/presentationml/2006/main">
+  <p:cSld>
+    <p:spTree>
+      <p:nvGrpSpPr>
+        <p:cNvPr id="1" name=""/>
+        <p:cNvGrpSpPr/>
+        <p:nvPr/>
+      </p:nvGrpSpPr>
+      <p:grpSpPr>
+        <a:xfrm>
+          <a:off x="0" y="0"/>
+          <a:ext cx="0" cy="0"/>
+          <a:chOff x="0" y="0"/>
+          <a:chExt cx="0" cy="0"/>
+        </a:xfrm>
+      </p:grpSpPr>
+      <p:sp>
+        <p:nvSpPr>
+          <p:cNvPr id="2" name="Slide Image Placeholder 1"/>
+          <p:cNvSpPr>
+            <a:spLocks noGrp="1" noRot="1" noChangeAspect="1"/>
+          </p:cNvSpPr>
+          <p:nvPr>
+            <p:ph type="sldImg"/>
+          </p:nvPr>
+        </p:nvSpPr>
+        <p:spPr/>
+      </p:sp>
+      <p:sp>
+        <p:nvSpPr>
+          <p:cNvPr id="3" name="Notes Placeholder 2"/>
+          <p:cNvSpPr>
+            <a:spLocks noGrp="1"/>
+          </p:cNvSpPr>
+          <p:nvPr>
+            <p:ph type="body" idx="1"/>
+          </p:nvPr>
+        </p:nvSpPr>
+        <p:spPr/>
+        <p:txBody>
+          <a:bodyPr/>
+          <a:lstStyle/>
+          <a:p>
+            <a:pPr marL="228600" indent="-228600">
+              <a:buAutoNum type="arabicParenR"/>
+            </a:pPr>
+            <a:r>
+              <a:rPr lang="en-IN" dirty="0"/>
+              <a:t>When a developer or an administrator performs an action on the repository, it triggers some event in the back ground e.g. when a dev pushes a change to a feature branch or an admin merges pull requests.</a:t>
+            </a:r>
+          </a:p>
+          <a:p>
+            <a:pPr marL="228600" indent="-228600">
+              <a:buAutoNum type="arabicParenR"/>
+            </a:pPr>
+            <a:r>
+              <a:rPr lang="en-IN" dirty="0"/>
+              <a:t>We can make the workflow trigger on multiple events e.g. we can have same workflow deploy a web app to staging resource group when there is a push or pull request on the staging branch</a:t>
+            </a:r>
+          </a:p>
+          <a:p>
+            <a:pPr marL="228600" indent="-228600">
+              <a:buAutoNum type="arabicParenR"/>
+            </a:pPr>
+            <a:r>
+              <a:rPr lang="en-IN" dirty="0"/>
+              <a:t>As we will see later, writing GitHub Actions is breeze, so we can set up multiple workflows to cater to CICD processes and also other admin processes like archiving old branches, managing releases etc</a:t>
+            </a:r>
+          </a:p>
+          <a:p>
+            <a:pPr marL="228600" indent="-228600">
+              <a:buAutoNum type="arabicParenR"/>
+            </a:pPr>
+            <a:endParaRPr lang="en-IN" dirty="0"/>
+          </a:p>
+        </p:txBody>
+      </p:sp>
+      <p:sp>
+        <p:nvSpPr>
+          <p:cNvPr id="4" name="Slide Number Placeholder 3"/>
+          <p:cNvSpPr>
+            <a:spLocks noGrp="1"/>
+          </p:cNvSpPr>
+          <p:nvPr>
+            <p:ph type="sldNum" sz="quarter" idx="5"/>
+          </p:nvPr>
+        </p:nvSpPr>
+        <p:spPr/>
+        <p:txBody>
+          <a:bodyPr/>
+          <a:lstStyle/>
+          <a:p>
+            <a:fld id="{D283D8B1-3260-4FDA-B133-ACB5BAEB9EAB}" type="slidenum">
+              <a:rPr lang="en-IN" smtClean="0"/>
+              <a:t>4</a:t>
+            </a:fld>
+            <a:endParaRPr lang="en-IN"/>
+          </a:p>
+        </p:txBody>
+      </p:sp>
+    </p:spTree>
+    <p:extLst>
+      <p:ext uri="{BB962C8B-B14F-4D97-AF65-F5344CB8AC3E}">
+        <p14:creationId xmlns:p14="http://schemas.microsoft.com/office/powerpoint/2010/main" val="947510991"/>
+      </p:ext>
+    </p:extLst>
+  </p:cSld>
+  <p:clrMapOvr>
+    <a:masterClrMapping/>
+  </p:clrMapOvr>
+</p:notes>
+</file>
+
+<file path=ppt/notesSlides/notesSlide4.xml><?xml version="1.0" encoding="utf-8"?>
+<p:notes xmlns:a="http://schemas.openxmlformats.org/drawingml/2006/main" xmlns:r="http://schemas.openxmlformats.org/officeDocument/2006/relationships" xmlns:p="http://schemas.openxmlformats.org/presentationml/2006/main">
+  <p:cSld>
+    <p:spTree>
+      <p:nvGrpSpPr>
+        <p:cNvPr id="1" name=""/>
+        <p:cNvGrpSpPr/>
+        <p:nvPr/>
+      </p:nvGrpSpPr>
+      <p:grpSpPr>
+        <a:xfrm>
+          <a:off x="0" y="0"/>
+          <a:ext cx="0" cy="0"/>
+          <a:chOff x="0" y="0"/>
+          <a:chExt cx="0" cy="0"/>
+        </a:xfrm>
+      </p:grpSpPr>
+      <p:sp>
+        <p:nvSpPr>
+          <p:cNvPr id="2" name="Slide Image Placeholder 1"/>
+          <p:cNvSpPr>
+            <a:spLocks noGrp="1" noRot="1" noChangeAspect="1"/>
+          </p:cNvSpPr>
+          <p:nvPr>
+            <p:ph type="sldImg"/>
+          </p:nvPr>
+        </p:nvSpPr>
+        <p:spPr/>
+      </p:sp>
+      <p:sp>
+        <p:nvSpPr>
+          <p:cNvPr id="3" name="Notes Placeholder 2"/>
+          <p:cNvSpPr>
+            <a:spLocks noGrp="1"/>
+          </p:cNvSpPr>
+          <p:nvPr>
+            <p:ph type="body" idx="1"/>
+          </p:nvPr>
+        </p:nvSpPr>
+        <p:spPr/>
+        <p:txBody>
+          <a:bodyPr/>
+          <a:lstStyle/>
+          <a:p>
+            <a:r>
+              <a:rPr lang="en-IN" dirty="0"/>
+              <a:t>GitHub has a lot of community created actions which we can use directly in our workflows. This reduces our work to set up the workflows. </a:t>
+            </a:r>
+            <a:r>
+              <a:rPr lang="en-IN" dirty="0" err="1"/>
+              <a:t>Infact</a:t>
+            </a:r>
+            <a:r>
+              <a:rPr lang="en-IN" dirty="0"/>
+              <a:t> todays demo uses one such action developed by Mr. Justin </a:t>
+            </a:r>
+            <a:r>
+              <a:rPr lang="en-IN" dirty="0" err="1"/>
+              <a:t>Yoo</a:t>
+            </a:r>
+            <a:r>
+              <a:rPr lang="en-IN" dirty="0"/>
+              <a:t> who will present later today in the boot camp.</a:t>
+            </a:r>
+          </a:p>
+          <a:p>
+            <a:endParaRPr lang="en-IN" dirty="0"/>
+          </a:p>
+          <a:p>
+            <a:r>
+              <a:rPr lang="en-IN" dirty="0"/>
+              <a:t>We can also write our own actions if needed.</a:t>
+            </a:r>
+          </a:p>
+        </p:txBody>
+      </p:sp>
+      <p:sp>
+        <p:nvSpPr>
+          <p:cNvPr id="4" name="Slide Number Placeholder 3"/>
+          <p:cNvSpPr>
+            <a:spLocks noGrp="1"/>
+          </p:cNvSpPr>
+          <p:nvPr>
+            <p:ph type="sldNum" sz="quarter" idx="5"/>
+          </p:nvPr>
+        </p:nvSpPr>
+        <p:spPr/>
+        <p:txBody>
+          <a:bodyPr/>
+          <a:lstStyle/>
+          <a:p>
+            <a:fld id="{D283D8B1-3260-4FDA-B133-ACB5BAEB9EAB}" type="slidenum">
+              <a:rPr lang="en-IN" smtClean="0"/>
+              <a:t>5</a:t>
+            </a:fld>
+            <a:endParaRPr lang="en-IN"/>
+          </a:p>
+        </p:txBody>
+      </p:sp>
+    </p:spTree>
+    <p:extLst>
+      <p:ext uri="{BB962C8B-B14F-4D97-AF65-F5344CB8AC3E}">
+        <p14:creationId xmlns:p14="http://schemas.microsoft.com/office/powerpoint/2010/main" val="3799258995"/>
+      </p:ext>
+    </p:extLst>
+  </p:cSld>
+  <p:clrMapOvr>
+    <a:masterClrMapping/>
+  </p:clrMapOvr>
+</p:notes>
+</file>
+
+<file path=ppt/notesSlides/notesSlide5.xml><?xml version="1.0" encoding="utf-8"?>
+<p:notes xmlns:a="http://schemas.openxmlformats.org/drawingml/2006/main" xmlns:r="http://schemas.openxmlformats.org/officeDocument/2006/relationships" xmlns:p="http://schemas.openxmlformats.org/presentationml/2006/main">
+  <p:cSld>
+    <p:spTree>
+      <p:nvGrpSpPr>
+        <p:cNvPr id="1" name=""/>
+        <p:cNvGrpSpPr/>
+        <p:nvPr/>
+      </p:nvGrpSpPr>
+      <p:grpSpPr>
+        <a:xfrm>
+          <a:off x="0" y="0"/>
+          <a:ext cx="0" cy="0"/>
+          <a:chOff x="0" y="0"/>
+          <a:chExt cx="0" cy="0"/>
+        </a:xfrm>
+      </p:grpSpPr>
+      <p:sp>
+        <p:nvSpPr>
+          <p:cNvPr id="2" name="Slide Image Placeholder 1"/>
+          <p:cNvSpPr>
+            <a:spLocks noGrp="1" noRot="1" noChangeAspect="1"/>
+          </p:cNvSpPr>
+          <p:nvPr>
+            <p:ph type="sldImg"/>
+          </p:nvPr>
+        </p:nvSpPr>
+        <p:spPr/>
+      </p:sp>
+      <p:sp>
+        <p:nvSpPr>
+          <p:cNvPr id="3" name="Notes Placeholder 2"/>
+          <p:cNvSpPr>
+            <a:spLocks noGrp="1"/>
+          </p:cNvSpPr>
+          <p:nvPr>
+            <p:ph type="body" idx="1"/>
+          </p:nvPr>
+        </p:nvSpPr>
+        <p:spPr/>
+        <p:txBody>
+          <a:bodyPr/>
+          <a:lstStyle/>
+          <a:p>
+            <a:r>
+              <a:rPr lang="en-IN" dirty="0"/>
+              <a:t>When the interested event occurs the GitHub Action workflow instance is started.</a:t>
+            </a:r>
+          </a:p>
+          <a:p>
+            <a:r>
+              <a:rPr lang="en-IN" dirty="0"/>
+              <a:t>The action contains  one or multiple jobs</a:t>
+            </a:r>
+          </a:p>
+          <a:p>
+            <a:r>
+              <a:rPr lang="en-IN" dirty="0"/>
+              <a:t>Each job can contain a single or set of multiple steps that are executed (which are executed sequentially or conditionally)</a:t>
+            </a:r>
+          </a:p>
+          <a:p>
+            <a:r>
+              <a:rPr lang="en-IN" dirty="0"/>
+              <a:t>Each step corresponds to a unit of work that will be performed. The step can execute an action e.g. checking out the repository  or it can execute commands like </a:t>
+            </a:r>
+            <a:r>
+              <a:rPr lang="en-IN" dirty="0" err="1"/>
+              <a:t>cmd</a:t>
+            </a:r>
+            <a:r>
+              <a:rPr lang="en-IN" dirty="0"/>
+              <a:t> or bash</a:t>
+            </a:r>
+          </a:p>
+          <a:p>
+            <a:r>
+              <a:rPr lang="en-IN" dirty="0"/>
+              <a:t>Each job runs on a Virtual Machine.</a:t>
+            </a:r>
+          </a:p>
+          <a:p>
+            <a:endParaRPr lang="en-IN" dirty="0"/>
+          </a:p>
+          <a:p>
+            <a:r>
+              <a:rPr lang="en-IN" dirty="0"/>
+              <a:t>We can segregate various tasks to run under various jobs, though this will require a careful designing as multiple jobs cannot share environment variables results etc.</a:t>
+            </a:r>
+          </a:p>
+          <a:p>
+            <a:endParaRPr lang="en-IN" dirty="0"/>
+          </a:p>
+        </p:txBody>
+      </p:sp>
+      <p:sp>
+        <p:nvSpPr>
+          <p:cNvPr id="4" name="Slide Number Placeholder 3"/>
+          <p:cNvSpPr>
+            <a:spLocks noGrp="1"/>
+          </p:cNvSpPr>
+          <p:nvPr>
+            <p:ph type="sldNum" sz="quarter" idx="5"/>
+          </p:nvPr>
+        </p:nvSpPr>
+        <p:spPr/>
+        <p:txBody>
+          <a:bodyPr/>
+          <a:lstStyle/>
+          <a:p>
+            <a:fld id="{D283D8B1-3260-4FDA-B133-ACB5BAEB9EAB}" type="slidenum">
+              <a:rPr lang="en-IN" smtClean="0"/>
+              <a:t>6</a:t>
+            </a:fld>
+            <a:endParaRPr lang="en-IN"/>
+          </a:p>
+        </p:txBody>
+      </p:sp>
+    </p:spTree>
+    <p:extLst>
+      <p:ext uri="{BB962C8B-B14F-4D97-AF65-F5344CB8AC3E}">
+        <p14:creationId xmlns:p14="http://schemas.microsoft.com/office/powerpoint/2010/main" val="1788018499"/>
+      </p:ext>
+    </p:extLst>
+  </p:cSld>
+  <p:clrMapOvr>
+    <a:masterClrMapping/>
+  </p:clrMapOvr>
+</p:notes>
+</file>
+
+<file path=ppt/notesSlides/notesSlide6.xml><?xml version="1.0" encoding="utf-8"?>
+<p:notes xmlns:a="http://schemas.openxmlformats.org/drawingml/2006/main" xmlns:r="http://schemas.openxmlformats.org/officeDocument/2006/relationships" xmlns:p="http://schemas.openxmlformats.org/presentationml/2006/main">
+  <p:cSld>
+    <p:spTree>
+      <p:nvGrpSpPr>
+        <p:cNvPr id="1" name=""/>
+        <p:cNvGrpSpPr/>
+        <p:nvPr/>
+      </p:nvGrpSpPr>
+      <p:grpSpPr>
+        <a:xfrm>
+          <a:off x="0" y="0"/>
+          <a:ext cx="0" cy="0"/>
+          <a:chOff x="0" y="0"/>
+          <a:chExt cx="0" cy="0"/>
+        </a:xfrm>
+      </p:grpSpPr>
+      <p:sp>
+        <p:nvSpPr>
+          <p:cNvPr id="2" name="Slide Image Placeholder 1"/>
+          <p:cNvSpPr>
+            <a:spLocks noGrp="1" noRot="1" noChangeAspect="1"/>
+          </p:cNvSpPr>
+          <p:nvPr>
+            <p:ph type="sldImg"/>
+          </p:nvPr>
+        </p:nvSpPr>
+        <p:spPr/>
+      </p:sp>
+      <p:sp>
+        <p:nvSpPr>
+          <p:cNvPr id="3" name="Notes Placeholder 2"/>
+          <p:cNvSpPr>
+            <a:spLocks noGrp="1"/>
+          </p:cNvSpPr>
+          <p:nvPr>
+            <p:ph type="body" idx="1"/>
+          </p:nvPr>
+        </p:nvSpPr>
+        <p:spPr/>
+        <p:txBody>
+          <a:bodyPr/>
+          <a:lstStyle/>
+          <a:p>
+            <a:endParaRPr lang="en-IN" dirty="0"/>
+          </a:p>
+        </p:txBody>
+      </p:sp>
+      <p:sp>
+        <p:nvSpPr>
+          <p:cNvPr id="4" name="Slide Number Placeholder 3"/>
+          <p:cNvSpPr>
+            <a:spLocks noGrp="1"/>
+          </p:cNvSpPr>
+          <p:nvPr>
+            <p:ph type="sldNum" sz="quarter" idx="5"/>
+          </p:nvPr>
+        </p:nvSpPr>
+        <p:spPr/>
+        <p:txBody>
+          <a:bodyPr/>
+          <a:lstStyle/>
+          <a:p>
+            <a:fld id="{D283D8B1-3260-4FDA-B133-ACB5BAEB9EAB}" type="slidenum">
+              <a:rPr lang="en-IN" smtClean="0"/>
+              <a:t>7</a:t>
+            </a:fld>
+            <a:endParaRPr lang="en-IN"/>
+          </a:p>
+        </p:txBody>
+      </p:sp>
+    </p:spTree>
+    <p:extLst>
+      <p:ext uri="{BB962C8B-B14F-4D97-AF65-F5344CB8AC3E}">
+        <p14:creationId xmlns:p14="http://schemas.microsoft.com/office/powerpoint/2010/main" val="3380824862"/>
+      </p:ext>
+    </p:extLst>
+  </p:cSld>
+  <p:clrMapOvr>
+    <a:masterClrMapping/>
+  </p:clrMapOvr>
+</p:notes>
+</file>
+
 <file path=ppt/slideLayouts/slideLayout1.xml><?xml version="1.0" encoding="utf-8"?>
 <p:sldLayout xmlns:a="http://schemas.openxmlformats.org/drawingml/2006/main" xmlns:r="http://schemas.openxmlformats.org/officeDocument/2006/relationships" xmlns:p="http://schemas.openxmlformats.org/presentationml/2006/main" showMasterSp="0" preserve="1" userDrawn="1">
   <p:cSld name="Title Slide">
@@ -942,7 +1934,7 @@
           <a:p>
             <a:fld id="{782F6819-D2A8-4655-B641-B9FC45F3017D}" type="datetimeFigureOut">
               <a:rPr lang="en-NZ" smtClean="0"/>
-              <a:t>18/02/2021</a:t>
+              <a:t>26/02/2021</a:t>
             </a:fld>
             <a:endParaRPr lang="en-NZ"/>
           </a:p>
@@ -1108,7 +2100,7 @@
           <a:p>
             <a:fld id="{782F6819-D2A8-4655-B641-B9FC45F3017D}" type="datetimeFigureOut">
               <a:rPr lang="en-NZ" smtClean="0"/>
-              <a:t>18/02/2021</a:t>
+              <a:t>26/02/2021</a:t>
             </a:fld>
             <a:endParaRPr lang="en-NZ"/>
           </a:p>
@@ -1245,7 +2237,7 @@
           <a:p>
             <a:fld id="{782F6819-D2A8-4655-B641-B9FC45F3017D}" type="datetimeFigureOut">
               <a:rPr lang="en-NZ" smtClean="0"/>
-              <a:t>18/02/2021</a:t>
+              <a:t>26/02/2021</a:t>
             </a:fld>
             <a:endParaRPr lang="en-NZ"/>
           </a:p>
@@ -1582,7 +2574,7 @@
           <a:p>
             <a:fld id="{782F6819-D2A8-4655-B641-B9FC45F3017D}" type="datetimeFigureOut">
               <a:rPr lang="en-NZ" smtClean="0"/>
-              <a:t>18/02/2021</a:t>
+              <a:t>26/02/2021</a:t>
             </a:fld>
             <a:endParaRPr lang="en-NZ"/>
           </a:p>
@@ -1895,7 +2887,7 @@
           <a:p>
             <a:fld id="{782F6819-D2A8-4655-B641-B9FC45F3017D}" type="datetimeFigureOut">
               <a:rPr lang="en-NZ" smtClean="0"/>
-              <a:t>18/02/2021</a:t>
+              <a:t>26/02/2021</a:t>
             </a:fld>
             <a:endParaRPr lang="en-NZ"/>
           </a:p>
@@ -2119,7 +3111,7 @@
           <a:p>
             <a:fld id="{782F6819-D2A8-4655-B641-B9FC45F3017D}" type="datetimeFigureOut">
               <a:rPr lang="en-NZ" smtClean="0"/>
-              <a:t>18/02/2021</a:t>
+              <a:t>26/02/2021</a:t>
             </a:fld>
             <a:endParaRPr lang="en-NZ"/>
           </a:p>
@@ -2353,7 +3345,7 @@
           <a:p>
             <a:fld id="{782F6819-D2A8-4655-B641-B9FC45F3017D}" type="datetimeFigureOut">
               <a:rPr lang="en-NZ" smtClean="0"/>
-              <a:t>18/02/2021</a:t>
+              <a:t>26/02/2021</a:t>
             </a:fld>
             <a:endParaRPr lang="en-NZ"/>
           </a:p>
@@ -4236,7 +5228,7 @@
           <a:p>
             <a:fld id="{782F6819-D2A8-4655-B641-B9FC45F3017D}" type="datetimeFigureOut">
               <a:rPr lang="en-NZ" smtClean="0"/>
-              <a:t>18/02/2021</a:t>
+              <a:t>26/02/2021</a:t>
             </a:fld>
             <a:endParaRPr lang="en-NZ"/>
           </a:p>
@@ -4528,7 +5520,7 @@
           <a:p>
             <a:fld id="{782F6819-D2A8-4655-B641-B9FC45F3017D}" type="datetimeFigureOut">
               <a:rPr lang="en-NZ" smtClean="0"/>
-              <a:t>18/02/2021</a:t>
+              <a:t>26/02/2021</a:t>
             </a:fld>
             <a:endParaRPr lang="en-NZ"/>
           </a:p>
@@ -5524,16 +6516,6 @@
             </a:pPr>
             <a:r>
               <a:rPr lang="pt-BR" dirty="0"/>
-              <a:t>Business and Integration Architecture Associate Manager at Accenture India</a:t>
-            </a:r>
-          </a:p>
-          <a:p>
-            <a:pPr marL="457200" indent="-457200">
-              <a:buFont typeface="Arial" panose="020B0604020202020204" pitchFamily="34" charset="0"/>
-              <a:buChar char="•"/>
-            </a:pPr>
-            <a:r>
-              <a:rPr lang="pt-BR" dirty="0"/>
               <a:t>Integration and all things Blazor fan</a:t>
             </a:r>
           </a:p>
@@ -5638,7 +6620,7 @@
           <p:nvPr/>
         </p:nvPicPr>
         <p:blipFill>
-          <a:blip r:embed="rId2">
+          <a:blip r:embed="rId3">
             <a:extLst>
               <a:ext uri="{28A0092B-C50C-407E-A947-70E740481C1C}">
                 <a14:useLocalDpi xmlns:a14="http://schemas.microsoft.com/office/drawing/2010/main" val="0"/>
@@ -5894,7 +6876,7 @@
           </p:nvPr>
         </p:nvPicPr>
         <p:blipFill>
-          <a:blip r:embed="rId3">
+          <a:blip r:embed="rId4">
             <a:extLst>
               <a:ext uri="{28A0092B-C50C-407E-A947-70E740481C1C}">
                 <a14:useLocalDpi xmlns:a14="http://schemas.microsoft.com/office/drawing/2010/main" val="0"/>
@@ -6018,7 +7000,7 @@
           <a:p>
             <a:r>
               <a:rPr lang="pt-BR" dirty="0"/>
-              <a:t>The What and The Why of GITHUB Actions</a:t>
+              <a:t>The What and The Why of GitHub Actions</a:t>
             </a:r>
           </a:p>
           <a:p>
@@ -6054,6 +7036,283 @@
   <p:clrMapOvr>
     <a:masterClrMapping/>
   </p:clrMapOvr>
+  <p:timing>
+    <p:tnLst>
+      <p:par>
+        <p:cTn id="1" dur="indefinite" restart="never" nodeType="tmRoot">
+          <p:childTnLst>
+            <p:seq concurrent="1" nextAc="seek">
+              <p:cTn id="2" dur="indefinite" nodeType="mainSeq">
+                <p:childTnLst>
+                  <p:par>
+                    <p:cTn id="3" fill="hold">
+                      <p:stCondLst>
+                        <p:cond delay="indefinite"/>
+                      </p:stCondLst>
+                      <p:childTnLst>
+                        <p:par>
+                          <p:cTn id="4" fill="hold">
+                            <p:stCondLst>
+                              <p:cond delay="0"/>
+                            </p:stCondLst>
+                            <p:childTnLst>
+                              <p:par>
+                                <p:cTn id="5" presetID="10" presetClass="entr" presetSubtype="0" fill="hold" grpId="0" nodeType="clickEffect">
+                                  <p:stCondLst>
+                                    <p:cond delay="0"/>
+                                  </p:stCondLst>
+                                  <p:childTnLst>
+                                    <p:set>
+                                      <p:cBhvr>
+                                        <p:cTn id="6" dur="1" fill="hold">
+                                          <p:stCondLst>
+                                            <p:cond delay="0"/>
+                                          </p:stCondLst>
+                                        </p:cTn>
+                                        <p:tgtEl>
+                                          <p:spTgt spid="3">
+                                            <p:txEl>
+                                              <p:pRg st="0" end="0"/>
+                                            </p:txEl>
+                                          </p:spTgt>
+                                        </p:tgtEl>
+                                        <p:attrNameLst>
+                                          <p:attrName>style.visibility</p:attrName>
+                                        </p:attrNameLst>
+                                      </p:cBhvr>
+                                      <p:to>
+                                        <p:strVal val="visible"/>
+                                      </p:to>
+                                    </p:set>
+                                    <p:animEffect transition="in" filter="fade">
+                                      <p:cBhvr>
+                                        <p:cTn id="7" dur="500"/>
+                                        <p:tgtEl>
+                                          <p:spTgt spid="3">
+                                            <p:txEl>
+                                              <p:pRg st="0" end="0"/>
+                                            </p:txEl>
+                                          </p:spTgt>
+                                        </p:tgtEl>
+                                      </p:cBhvr>
+                                    </p:animEffect>
+                                  </p:childTnLst>
+                                </p:cTn>
+                              </p:par>
+                            </p:childTnLst>
+                          </p:cTn>
+                        </p:par>
+                      </p:childTnLst>
+                    </p:cTn>
+                  </p:par>
+                  <p:par>
+                    <p:cTn id="8" fill="hold">
+                      <p:stCondLst>
+                        <p:cond delay="indefinite"/>
+                      </p:stCondLst>
+                      <p:childTnLst>
+                        <p:par>
+                          <p:cTn id="9" fill="hold">
+                            <p:stCondLst>
+                              <p:cond delay="0"/>
+                            </p:stCondLst>
+                            <p:childTnLst>
+                              <p:par>
+                                <p:cTn id="10" presetID="10" presetClass="entr" presetSubtype="0" fill="hold" grpId="0" nodeType="clickEffect">
+                                  <p:stCondLst>
+                                    <p:cond delay="0"/>
+                                  </p:stCondLst>
+                                  <p:childTnLst>
+                                    <p:set>
+                                      <p:cBhvr>
+                                        <p:cTn id="11" dur="1" fill="hold">
+                                          <p:stCondLst>
+                                            <p:cond delay="0"/>
+                                          </p:stCondLst>
+                                        </p:cTn>
+                                        <p:tgtEl>
+                                          <p:spTgt spid="3">
+                                            <p:txEl>
+                                              <p:pRg st="1" end="1"/>
+                                            </p:txEl>
+                                          </p:spTgt>
+                                        </p:tgtEl>
+                                        <p:attrNameLst>
+                                          <p:attrName>style.visibility</p:attrName>
+                                        </p:attrNameLst>
+                                      </p:cBhvr>
+                                      <p:to>
+                                        <p:strVal val="visible"/>
+                                      </p:to>
+                                    </p:set>
+                                    <p:animEffect transition="in" filter="fade">
+                                      <p:cBhvr>
+                                        <p:cTn id="12" dur="500"/>
+                                        <p:tgtEl>
+                                          <p:spTgt spid="3">
+                                            <p:txEl>
+                                              <p:pRg st="1" end="1"/>
+                                            </p:txEl>
+                                          </p:spTgt>
+                                        </p:tgtEl>
+                                      </p:cBhvr>
+                                    </p:animEffect>
+                                  </p:childTnLst>
+                                </p:cTn>
+                              </p:par>
+                            </p:childTnLst>
+                          </p:cTn>
+                        </p:par>
+                      </p:childTnLst>
+                    </p:cTn>
+                  </p:par>
+                  <p:par>
+                    <p:cTn id="13" fill="hold">
+                      <p:stCondLst>
+                        <p:cond delay="indefinite"/>
+                      </p:stCondLst>
+                      <p:childTnLst>
+                        <p:par>
+                          <p:cTn id="14" fill="hold">
+                            <p:stCondLst>
+                              <p:cond delay="0"/>
+                            </p:stCondLst>
+                            <p:childTnLst>
+                              <p:par>
+                                <p:cTn id="15" presetID="10" presetClass="entr" presetSubtype="0" fill="hold" grpId="0" nodeType="clickEffect">
+                                  <p:stCondLst>
+                                    <p:cond delay="0"/>
+                                  </p:stCondLst>
+                                  <p:childTnLst>
+                                    <p:set>
+                                      <p:cBhvr>
+                                        <p:cTn id="16" dur="1" fill="hold">
+                                          <p:stCondLst>
+                                            <p:cond delay="0"/>
+                                          </p:stCondLst>
+                                        </p:cTn>
+                                        <p:tgtEl>
+                                          <p:spTgt spid="3">
+                                            <p:txEl>
+                                              <p:pRg st="2" end="2"/>
+                                            </p:txEl>
+                                          </p:spTgt>
+                                        </p:tgtEl>
+                                        <p:attrNameLst>
+                                          <p:attrName>style.visibility</p:attrName>
+                                        </p:attrNameLst>
+                                      </p:cBhvr>
+                                      <p:to>
+                                        <p:strVal val="visible"/>
+                                      </p:to>
+                                    </p:set>
+                                    <p:animEffect transition="in" filter="fade">
+                                      <p:cBhvr>
+                                        <p:cTn id="17" dur="500"/>
+                                        <p:tgtEl>
+                                          <p:spTgt spid="3">
+                                            <p:txEl>
+                                              <p:pRg st="2" end="2"/>
+                                            </p:txEl>
+                                          </p:spTgt>
+                                        </p:tgtEl>
+                                      </p:cBhvr>
+                                    </p:animEffect>
+                                  </p:childTnLst>
+                                </p:cTn>
+                              </p:par>
+                            </p:childTnLst>
+                          </p:cTn>
+                        </p:par>
+                      </p:childTnLst>
+                    </p:cTn>
+                  </p:par>
+                  <p:par>
+                    <p:cTn id="18" fill="hold">
+                      <p:stCondLst>
+                        <p:cond delay="indefinite"/>
+                      </p:stCondLst>
+                      <p:childTnLst>
+                        <p:par>
+                          <p:cTn id="19" fill="hold">
+                            <p:stCondLst>
+                              <p:cond delay="0"/>
+                            </p:stCondLst>
+                            <p:childTnLst>
+                              <p:par>
+                                <p:cTn id="20" presetID="10" presetClass="entr" presetSubtype="0" fill="hold" grpId="0" nodeType="clickEffect">
+                                  <p:stCondLst>
+                                    <p:cond delay="0"/>
+                                  </p:stCondLst>
+                                  <p:childTnLst>
+                                    <p:set>
+                                      <p:cBhvr>
+                                        <p:cTn id="21" dur="1" fill="hold">
+                                          <p:stCondLst>
+                                            <p:cond delay="0"/>
+                                          </p:stCondLst>
+                                        </p:cTn>
+                                        <p:tgtEl>
+                                          <p:spTgt spid="3">
+                                            <p:txEl>
+                                              <p:pRg st="3" end="3"/>
+                                            </p:txEl>
+                                          </p:spTgt>
+                                        </p:tgtEl>
+                                        <p:attrNameLst>
+                                          <p:attrName>style.visibility</p:attrName>
+                                        </p:attrNameLst>
+                                      </p:cBhvr>
+                                      <p:to>
+                                        <p:strVal val="visible"/>
+                                      </p:to>
+                                    </p:set>
+                                    <p:animEffect transition="in" filter="fade">
+                                      <p:cBhvr>
+                                        <p:cTn id="22" dur="500"/>
+                                        <p:tgtEl>
+                                          <p:spTgt spid="3">
+                                            <p:txEl>
+                                              <p:pRg st="3" end="3"/>
+                                            </p:txEl>
+                                          </p:spTgt>
+                                        </p:tgtEl>
+                                      </p:cBhvr>
+                                    </p:animEffect>
+                                  </p:childTnLst>
+                                </p:cTn>
+                              </p:par>
+                            </p:childTnLst>
+                          </p:cTn>
+                        </p:par>
+                      </p:childTnLst>
+                    </p:cTn>
+                  </p:par>
+                </p:childTnLst>
+              </p:cTn>
+              <p:prevCondLst>
+                <p:cond evt="onPrev" delay="0">
+                  <p:tgtEl>
+                    <p:sldTgt/>
+                  </p:tgtEl>
+                </p:cond>
+              </p:prevCondLst>
+              <p:nextCondLst>
+                <p:cond evt="onNext" delay="0">
+                  <p:tgtEl>
+                    <p:sldTgt/>
+                  </p:tgtEl>
+                </p:cond>
+              </p:nextCondLst>
+            </p:seq>
+          </p:childTnLst>
+        </p:cTn>
+      </p:par>
+    </p:tnLst>
+    <p:bldLst>
+      <p:bldP spid="3" grpId="0" build="p"/>
+    </p:bldLst>
+  </p:timing>
 </p:sld>
 </file>
 
@@ -6123,27 +7382,43 @@
           <a:bodyPr/>
           <a:lstStyle/>
           <a:p>
+            <a:pPr marL="514350" indent="-514350">
+              <a:buFont typeface="+mj-lt"/>
+              <a:buAutoNum type="arabicPeriod"/>
+            </a:pPr>
             <a:r>
               <a:rPr lang="en-IN" dirty="0"/>
               <a:t>GitHub Actions are the event driven workflows defined on GitHub repositories</a:t>
             </a:r>
           </a:p>
           <a:p>
+            <a:pPr marL="514350" indent="-514350">
+              <a:buFont typeface="+mj-lt"/>
+              <a:buAutoNum type="arabicPeriod"/>
+            </a:pPr>
             <a:r>
               <a:rPr lang="en-IN" dirty="0"/>
               <a:t>Can be configured to trigger on one or multiple events that occur on a repository</a:t>
             </a:r>
           </a:p>
           <a:p>
+            <a:pPr marL="514350" indent="-514350">
+              <a:buFont typeface="+mj-lt"/>
+              <a:buAutoNum type="arabicPeriod"/>
+            </a:pPr>
             <a:r>
               <a:rPr lang="en-IN" dirty="0"/>
               <a:t>Provide a simple way to automate many tasks right from CICD pipelines to release management and administration</a:t>
             </a:r>
           </a:p>
           <a:p>
+            <a:pPr marL="514350" indent="-514350">
+              <a:buFont typeface="+mj-lt"/>
+              <a:buAutoNum type="arabicPeriod"/>
+            </a:pPr>
             <a:r>
               <a:rPr lang="en-IN" dirty="0"/>
-              <a:t>Work with Pay as You Go structure (public repo get free execution)</a:t>
+              <a:t>Work with Pay as You Go structure (public repo gets free execution)</a:t>
             </a:r>
           </a:p>
         </p:txBody>
@@ -6158,6 +7433,283 @@
   <p:clrMapOvr>
     <a:masterClrMapping/>
   </p:clrMapOvr>
+  <p:timing>
+    <p:tnLst>
+      <p:par>
+        <p:cTn id="1" dur="indefinite" restart="never" nodeType="tmRoot">
+          <p:childTnLst>
+            <p:seq concurrent="1" nextAc="seek">
+              <p:cTn id="2" dur="indefinite" nodeType="mainSeq">
+                <p:childTnLst>
+                  <p:par>
+                    <p:cTn id="3" fill="hold">
+                      <p:stCondLst>
+                        <p:cond delay="indefinite"/>
+                      </p:stCondLst>
+                      <p:childTnLst>
+                        <p:par>
+                          <p:cTn id="4" fill="hold">
+                            <p:stCondLst>
+                              <p:cond delay="0"/>
+                            </p:stCondLst>
+                            <p:childTnLst>
+                              <p:par>
+                                <p:cTn id="5" presetID="10" presetClass="entr" presetSubtype="0" fill="hold" grpId="0" nodeType="clickEffect">
+                                  <p:stCondLst>
+                                    <p:cond delay="0"/>
+                                  </p:stCondLst>
+                                  <p:childTnLst>
+                                    <p:set>
+                                      <p:cBhvr>
+                                        <p:cTn id="6" dur="1" fill="hold">
+                                          <p:stCondLst>
+                                            <p:cond delay="0"/>
+                                          </p:stCondLst>
+                                        </p:cTn>
+                                        <p:tgtEl>
+                                          <p:spTgt spid="3">
+                                            <p:txEl>
+                                              <p:pRg st="0" end="0"/>
+                                            </p:txEl>
+                                          </p:spTgt>
+                                        </p:tgtEl>
+                                        <p:attrNameLst>
+                                          <p:attrName>style.visibility</p:attrName>
+                                        </p:attrNameLst>
+                                      </p:cBhvr>
+                                      <p:to>
+                                        <p:strVal val="visible"/>
+                                      </p:to>
+                                    </p:set>
+                                    <p:animEffect transition="in" filter="fade">
+                                      <p:cBhvr>
+                                        <p:cTn id="7" dur="500"/>
+                                        <p:tgtEl>
+                                          <p:spTgt spid="3">
+                                            <p:txEl>
+                                              <p:pRg st="0" end="0"/>
+                                            </p:txEl>
+                                          </p:spTgt>
+                                        </p:tgtEl>
+                                      </p:cBhvr>
+                                    </p:animEffect>
+                                  </p:childTnLst>
+                                </p:cTn>
+                              </p:par>
+                            </p:childTnLst>
+                          </p:cTn>
+                        </p:par>
+                      </p:childTnLst>
+                    </p:cTn>
+                  </p:par>
+                  <p:par>
+                    <p:cTn id="8" fill="hold">
+                      <p:stCondLst>
+                        <p:cond delay="indefinite"/>
+                      </p:stCondLst>
+                      <p:childTnLst>
+                        <p:par>
+                          <p:cTn id="9" fill="hold">
+                            <p:stCondLst>
+                              <p:cond delay="0"/>
+                            </p:stCondLst>
+                            <p:childTnLst>
+                              <p:par>
+                                <p:cTn id="10" presetID="10" presetClass="entr" presetSubtype="0" fill="hold" grpId="0" nodeType="clickEffect">
+                                  <p:stCondLst>
+                                    <p:cond delay="0"/>
+                                  </p:stCondLst>
+                                  <p:childTnLst>
+                                    <p:set>
+                                      <p:cBhvr>
+                                        <p:cTn id="11" dur="1" fill="hold">
+                                          <p:stCondLst>
+                                            <p:cond delay="0"/>
+                                          </p:stCondLst>
+                                        </p:cTn>
+                                        <p:tgtEl>
+                                          <p:spTgt spid="3">
+                                            <p:txEl>
+                                              <p:pRg st="1" end="1"/>
+                                            </p:txEl>
+                                          </p:spTgt>
+                                        </p:tgtEl>
+                                        <p:attrNameLst>
+                                          <p:attrName>style.visibility</p:attrName>
+                                        </p:attrNameLst>
+                                      </p:cBhvr>
+                                      <p:to>
+                                        <p:strVal val="visible"/>
+                                      </p:to>
+                                    </p:set>
+                                    <p:animEffect transition="in" filter="fade">
+                                      <p:cBhvr>
+                                        <p:cTn id="12" dur="500"/>
+                                        <p:tgtEl>
+                                          <p:spTgt spid="3">
+                                            <p:txEl>
+                                              <p:pRg st="1" end="1"/>
+                                            </p:txEl>
+                                          </p:spTgt>
+                                        </p:tgtEl>
+                                      </p:cBhvr>
+                                    </p:animEffect>
+                                  </p:childTnLst>
+                                </p:cTn>
+                              </p:par>
+                            </p:childTnLst>
+                          </p:cTn>
+                        </p:par>
+                      </p:childTnLst>
+                    </p:cTn>
+                  </p:par>
+                  <p:par>
+                    <p:cTn id="13" fill="hold">
+                      <p:stCondLst>
+                        <p:cond delay="indefinite"/>
+                      </p:stCondLst>
+                      <p:childTnLst>
+                        <p:par>
+                          <p:cTn id="14" fill="hold">
+                            <p:stCondLst>
+                              <p:cond delay="0"/>
+                            </p:stCondLst>
+                            <p:childTnLst>
+                              <p:par>
+                                <p:cTn id="15" presetID="10" presetClass="entr" presetSubtype="0" fill="hold" grpId="0" nodeType="clickEffect">
+                                  <p:stCondLst>
+                                    <p:cond delay="0"/>
+                                  </p:stCondLst>
+                                  <p:childTnLst>
+                                    <p:set>
+                                      <p:cBhvr>
+                                        <p:cTn id="16" dur="1" fill="hold">
+                                          <p:stCondLst>
+                                            <p:cond delay="0"/>
+                                          </p:stCondLst>
+                                        </p:cTn>
+                                        <p:tgtEl>
+                                          <p:spTgt spid="3">
+                                            <p:txEl>
+                                              <p:pRg st="2" end="2"/>
+                                            </p:txEl>
+                                          </p:spTgt>
+                                        </p:tgtEl>
+                                        <p:attrNameLst>
+                                          <p:attrName>style.visibility</p:attrName>
+                                        </p:attrNameLst>
+                                      </p:cBhvr>
+                                      <p:to>
+                                        <p:strVal val="visible"/>
+                                      </p:to>
+                                    </p:set>
+                                    <p:animEffect transition="in" filter="fade">
+                                      <p:cBhvr>
+                                        <p:cTn id="17" dur="500"/>
+                                        <p:tgtEl>
+                                          <p:spTgt spid="3">
+                                            <p:txEl>
+                                              <p:pRg st="2" end="2"/>
+                                            </p:txEl>
+                                          </p:spTgt>
+                                        </p:tgtEl>
+                                      </p:cBhvr>
+                                    </p:animEffect>
+                                  </p:childTnLst>
+                                </p:cTn>
+                              </p:par>
+                            </p:childTnLst>
+                          </p:cTn>
+                        </p:par>
+                      </p:childTnLst>
+                    </p:cTn>
+                  </p:par>
+                  <p:par>
+                    <p:cTn id="18" fill="hold">
+                      <p:stCondLst>
+                        <p:cond delay="indefinite"/>
+                      </p:stCondLst>
+                      <p:childTnLst>
+                        <p:par>
+                          <p:cTn id="19" fill="hold">
+                            <p:stCondLst>
+                              <p:cond delay="0"/>
+                            </p:stCondLst>
+                            <p:childTnLst>
+                              <p:par>
+                                <p:cTn id="20" presetID="10" presetClass="entr" presetSubtype="0" fill="hold" grpId="0" nodeType="clickEffect">
+                                  <p:stCondLst>
+                                    <p:cond delay="0"/>
+                                  </p:stCondLst>
+                                  <p:childTnLst>
+                                    <p:set>
+                                      <p:cBhvr>
+                                        <p:cTn id="21" dur="1" fill="hold">
+                                          <p:stCondLst>
+                                            <p:cond delay="0"/>
+                                          </p:stCondLst>
+                                        </p:cTn>
+                                        <p:tgtEl>
+                                          <p:spTgt spid="3">
+                                            <p:txEl>
+                                              <p:pRg st="3" end="3"/>
+                                            </p:txEl>
+                                          </p:spTgt>
+                                        </p:tgtEl>
+                                        <p:attrNameLst>
+                                          <p:attrName>style.visibility</p:attrName>
+                                        </p:attrNameLst>
+                                      </p:cBhvr>
+                                      <p:to>
+                                        <p:strVal val="visible"/>
+                                      </p:to>
+                                    </p:set>
+                                    <p:animEffect transition="in" filter="fade">
+                                      <p:cBhvr>
+                                        <p:cTn id="22" dur="500"/>
+                                        <p:tgtEl>
+                                          <p:spTgt spid="3">
+                                            <p:txEl>
+                                              <p:pRg st="3" end="3"/>
+                                            </p:txEl>
+                                          </p:spTgt>
+                                        </p:tgtEl>
+                                      </p:cBhvr>
+                                    </p:animEffect>
+                                  </p:childTnLst>
+                                </p:cTn>
+                              </p:par>
+                            </p:childTnLst>
+                          </p:cTn>
+                        </p:par>
+                      </p:childTnLst>
+                    </p:cTn>
+                  </p:par>
+                </p:childTnLst>
+              </p:cTn>
+              <p:prevCondLst>
+                <p:cond evt="onPrev" delay="0">
+                  <p:tgtEl>
+                    <p:sldTgt/>
+                  </p:tgtEl>
+                </p:cond>
+              </p:prevCondLst>
+              <p:nextCondLst>
+                <p:cond evt="onNext" delay="0">
+                  <p:tgtEl>
+                    <p:sldTgt/>
+                  </p:tgtEl>
+                </p:cond>
+              </p:nextCondLst>
+            </p:seq>
+          </p:childTnLst>
+        </p:cTn>
+      </p:par>
+    </p:tnLst>
+    <p:bldLst>
+      <p:bldP spid="3" grpId="0" build="p"/>
+    </p:bldLst>
+  </p:timing>
 </p:sld>
 </file>
 
@@ -6227,21 +7779,33 @@
           <a:bodyPr/>
           <a:lstStyle/>
           <a:p>
+            <a:pPr marL="514350" indent="-514350">
+              <a:buFont typeface="+mj-lt"/>
+              <a:buAutoNum type="arabicPeriod"/>
+            </a:pPr>
             <a:r>
               <a:rPr lang="en-IN" dirty="0"/>
               <a:t>Tight Integration with GitHub repositories</a:t>
             </a:r>
           </a:p>
           <a:p>
+            <a:pPr marL="514350" indent="-514350">
+              <a:buFont typeface="+mj-lt"/>
+              <a:buAutoNum type="arabicPeriod"/>
+            </a:pPr>
             <a:r>
               <a:rPr lang="en-IN" dirty="0"/>
               <a:t>Easy to set up</a:t>
             </a:r>
           </a:p>
           <a:p>
+            <a:pPr marL="514350" indent="-514350">
+              <a:buFont typeface="+mj-lt"/>
+              <a:buAutoNum type="arabicPeriod"/>
+            </a:pPr>
             <a:r>
               <a:rPr lang="en-IN" dirty="0"/>
-              <a:t>Can be configured using simple </a:t>
+              <a:t>Can be configured using simple .</a:t>
             </a:r>
             <a:r>
               <a:rPr lang="en-IN" dirty="0" err="1"/>
@@ -6253,6 +7817,10 @@
             </a:r>
           </a:p>
           <a:p>
+            <a:pPr marL="514350" indent="-514350">
+              <a:buFont typeface="+mj-lt"/>
+              <a:buAutoNum type="arabicPeriod"/>
+            </a:pPr>
             <a:r>
               <a:rPr lang="en-IN" dirty="0"/>
               <a:t>Plethora of inbuilt as well as community actions to automate tasks</a:t>
@@ -6273,6 +7841,283 @@
   <p:clrMapOvr>
     <a:masterClrMapping/>
   </p:clrMapOvr>
+  <p:timing>
+    <p:tnLst>
+      <p:par>
+        <p:cTn id="1" dur="indefinite" restart="never" nodeType="tmRoot">
+          <p:childTnLst>
+            <p:seq concurrent="1" nextAc="seek">
+              <p:cTn id="2" dur="indefinite" nodeType="mainSeq">
+                <p:childTnLst>
+                  <p:par>
+                    <p:cTn id="3" fill="hold">
+                      <p:stCondLst>
+                        <p:cond delay="indefinite"/>
+                      </p:stCondLst>
+                      <p:childTnLst>
+                        <p:par>
+                          <p:cTn id="4" fill="hold">
+                            <p:stCondLst>
+                              <p:cond delay="0"/>
+                            </p:stCondLst>
+                            <p:childTnLst>
+                              <p:par>
+                                <p:cTn id="5" presetID="10" presetClass="entr" presetSubtype="0" fill="hold" grpId="0" nodeType="clickEffect">
+                                  <p:stCondLst>
+                                    <p:cond delay="0"/>
+                                  </p:stCondLst>
+                                  <p:childTnLst>
+                                    <p:set>
+                                      <p:cBhvr>
+                                        <p:cTn id="6" dur="1" fill="hold">
+                                          <p:stCondLst>
+                                            <p:cond delay="0"/>
+                                          </p:stCondLst>
+                                        </p:cTn>
+                                        <p:tgtEl>
+                                          <p:spTgt spid="3">
+                                            <p:txEl>
+                                              <p:pRg st="0" end="0"/>
+                                            </p:txEl>
+                                          </p:spTgt>
+                                        </p:tgtEl>
+                                        <p:attrNameLst>
+                                          <p:attrName>style.visibility</p:attrName>
+                                        </p:attrNameLst>
+                                      </p:cBhvr>
+                                      <p:to>
+                                        <p:strVal val="visible"/>
+                                      </p:to>
+                                    </p:set>
+                                    <p:animEffect transition="in" filter="fade">
+                                      <p:cBhvr>
+                                        <p:cTn id="7" dur="500"/>
+                                        <p:tgtEl>
+                                          <p:spTgt spid="3">
+                                            <p:txEl>
+                                              <p:pRg st="0" end="0"/>
+                                            </p:txEl>
+                                          </p:spTgt>
+                                        </p:tgtEl>
+                                      </p:cBhvr>
+                                    </p:animEffect>
+                                  </p:childTnLst>
+                                </p:cTn>
+                              </p:par>
+                            </p:childTnLst>
+                          </p:cTn>
+                        </p:par>
+                      </p:childTnLst>
+                    </p:cTn>
+                  </p:par>
+                  <p:par>
+                    <p:cTn id="8" fill="hold">
+                      <p:stCondLst>
+                        <p:cond delay="indefinite"/>
+                      </p:stCondLst>
+                      <p:childTnLst>
+                        <p:par>
+                          <p:cTn id="9" fill="hold">
+                            <p:stCondLst>
+                              <p:cond delay="0"/>
+                            </p:stCondLst>
+                            <p:childTnLst>
+                              <p:par>
+                                <p:cTn id="10" presetID="10" presetClass="entr" presetSubtype="0" fill="hold" grpId="0" nodeType="clickEffect">
+                                  <p:stCondLst>
+                                    <p:cond delay="0"/>
+                                  </p:stCondLst>
+                                  <p:childTnLst>
+                                    <p:set>
+                                      <p:cBhvr>
+                                        <p:cTn id="11" dur="1" fill="hold">
+                                          <p:stCondLst>
+                                            <p:cond delay="0"/>
+                                          </p:stCondLst>
+                                        </p:cTn>
+                                        <p:tgtEl>
+                                          <p:spTgt spid="3">
+                                            <p:txEl>
+                                              <p:pRg st="1" end="1"/>
+                                            </p:txEl>
+                                          </p:spTgt>
+                                        </p:tgtEl>
+                                        <p:attrNameLst>
+                                          <p:attrName>style.visibility</p:attrName>
+                                        </p:attrNameLst>
+                                      </p:cBhvr>
+                                      <p:to>
+                                        <p:strVal val="visible"/>
+                                      </p:to>
+                                    </p:set>
+                                    <p:animEffect transition="in" filter="fade">
+                                      <p:cBhvr>
+                                        <p:cTn id="12" dur="500"/>
+                                        <p:tgtEl>
+                                          <p:spTgt spid="3">
+                                            <p:txEl>
+                                              <p:pRg st="1" end="1"/>
+                                            </p:txEl>
+                                          </p:spTgt>
+                                        </p:tgtEl>
+                                      </p:cBhvr>
+                                    </p:animEffect>
+                                  </p:childTnLst>
+                                </p:cTn>
+                              </p:par>
+                            </p:childTnLst>
+                          </p:cTn>
+                        </p:par>
+                      </p:childTnLst>
+                    </p:cTn>
+                  </p:par>
+                  <p:par>
+                    <p:cTn id="13" fill="hold">
+                      <p:stCondLst>
+                        <p:cond delay="indefinite"/>
+                      </p:stCondLst>
+                      <p:childTnLst>
+                        <p:par>
+                          <p:cTn id="14" fill="hold">
+                            <p:stCondLst>
+                              <p:cond delay="0"/>
+                            </p:stCondLst>
+                            <p:childTnLst>
+                              <p:par>
+                                <p:cTn id="15" presetID="10" presetClass="entr" presetSubtype="0" fill="hold" grpId="0" nodeType="clickEffect">
+                                  <p:stCondLst>
+                                    <p:cond delay="0"/>
+                                  </p:stCondLst>
+                                  <p:childTnLst>
+                                    <p:set>
+                                      <p:cBhvr>
+                                        <p:cTn id="16" dur="1" fill="hold">
+                                          <p:stCondLst>
+                                            <p:cond delay="0"/>
+                                          </p:stCondLst>
+                                        </p:cTn>
+                                        <p:tgtEl>
+                                          <p:spTgt spid="3">
+                                            <p:txEl>
+                                              <p:pRg st="2" end="2"/>
+                                            </p:txEl>
+                                          </p:spTgt>
+                                        </p:tgtEl>
+                                        <p:attrNameLst>
+                                          <p:attrName>style.visibility</p:attrName>
+                                        </p:attrNameLst>
+                                      </p:cBhvr>
+                                      <p:to>
+                                        <p:strVal val="visible"/>
+                                      </p:to>
+                                    </p:set>
+                                    <p:animEffect transition="in" filter="fade">
+                                      <p:cBhvr>
+                                        <p:cTn id="17" dur="500"/>
+                                        <p:tgtEl>
+                                          <p:spTgt spid="3">
+                                            <p:txEl>
+                                              <p:pRg st="2" end="2"/>
+                                            </p:txEl>
+                                          </p:spTgt>
+                                        </p:tgtEl>
+                                      </p:cBhvr>
+                                    </p:animEffect>
+                                  </p:childTnLst>
+                                </p:cTn>
+                              </p:par>
+                            </p:childTnLst>
+                          </p:cTn>
+                        </p:par>
+                      </p:childTnLst>
+                    </p:cTn>
+                  </p:par>
+                  <p:par>
+                    <p:cTn id="18" fill="hold">
+                      <p:stCondLst>
+                        <p:cond delay="indefinite"/>
+                      </p:stCondLst>
+                      <p:childTnLst>
+                        <p:par>
+                          <p:cTn id="19" fill="hold">
+                            <p:stCondLst>
+                              <p:cond delay="0"/>
+                            </p:stCondLst>
+                            <p:childTnLst>
+                              <p:par>
+                                <p:cTn id="20" presetID="10" presetClass="entr" presetSubtype="0" fill="hold" grpId="0" nodeType="clickEffect">
+                                  <p:stCondLst>
+                                    <p:cond delay="0"/>
+                                  </p:stCondLst>
+                                  <p:childTnLst>
+                                    <p:set>
+                                      <p:cBhvr>
+                                        <p:cTn id="21" dur="1" fill="hold">
+                                          <p:stCondLst>
+                                            <p:cond delay="0"/>
+                                          </p:stCondLst>
+                                        </p:cTn>
+                                        <p:tgtEl>
+                                          <p:spTgt spid="3">
+                                            <p:txEl>
+                                              <p:pRg st="3" end="3"/>
+                                            </p:txEl>
+                                          </p:spTgt>
+                                        </p:tgtEl>
+                                        <p:attrNameLst>
+                                          <p:attrName>style.visibility</p:attrName>
+                                        </p:attrNameLst>
+                                      </p:cBhvr>
+                                      <p:to>
+                                        <p:strVal val="visible"/>
+                                      </p:to>
+                                    </p:set>
+                                    <p:animEffect transition="in" filter="fade">
+                                      <p:cBhvr>
+                                        <p:cTn id="22" dur="500"/>
+                                        <p:tgtEl>
+                                          <p:spTgt spid="3">
+                                            <p:txEl>
+                                              <p:pRg st="3" end="3"/>
+                                            </p:txEl>
+                                          </p:spTgt>
+                                        </p:tgtEl>
+                                      </p:cBhvr>
+                                    </p:animEffect>
+                                  </p:childTnLst>
+                                </p:cTn>
+                              </p:par>
+                            </p:childTnLst>
+                          </p:cTn>
+                        </p:par>
+                      </p:childTnLst>
+                    </p:cTn>
+                  </p:par>
+                </p:childTnLst>
+              </p:cTn>
+              <p:prevCondLst>
+                <p:cond evt="onPrev" delay="0">
+                  <p:tgtEl>
+                    <p:sldTgt/>
+                  </p:tgtEl>
+                </p:cond>
+              </p:prevCondLst>
+              <p:nextCondLst>
+                <p:cond evt="onNext" delay="0">
+                  <p:tgtEl>
+                    <p:sldTgt/>
+                  </p:tgtEl>
+                </p:cond>
+              </p:nextCondLst>
+            </p:seq>
+          </p:childTnLst>
+        </p:cTn>
+      </p:par>
+    </p:tnLst>
+    <p:bldLst>
+      <p:bldP spid="3" grpId="0" build="p"/>
+    </p:bldLst>
+  </p:timing>
 </p:sld>
 </file>
 
@@ -6338,7 +8183,7 @@
           </p:nvPr>
         </p:nvPicPr>
         <p:blipFill>
-          <a:blip r:embed="rId2">
+          <a:blip r:embed="rId3">
             <a:extLst>
               <a:ext uri="{28A0092B-C50C-407E-A947-70E740481C1C}">
                 <a14:useLocalDpi xmlns:a14="http://schemas.microsoft.com/office/drawing/2010/main" val="0"/>
@@ -6451,7 +8296,7 @@
           <p:nvPr/>
         </p:nvPicPr>
         <p:blipFill>
-          <a:blip r:embed="rId2"/>
+          <a:blip r:embed="rId3"/>
           <a:stretch>
             <a:fillRect/>
           </a:stretch>
@@ -6481,7 +8326,7 @@
           <p:nvPr/>
         </p:nvPicPr>
         <p:blipFill>
-          <a:blip r:embed="rId3"/>
+          <a:blip r:embed="rId4"/>
           <a:stretch>
             <a:fillRect/>
           </a:stretch>
@@ -6511,7 +8356,7 @@
           <p:nvPr/>
         </p:nvPicPr>
         <p:blipFill>
-          <a:blip r:embed="rId4"/>
+          <a:blip r:embed="rId5"/>
           <a:stretch>
             <a:fillRect/>
           </a:stretch>
@@ -6541,7 +8386,7 @@
           <p:nvPr/>
         </p:nvPicPr>
         <p:blipFill>
-          <a:blip r:embed="rId5"/>
+          <a:blip r:embed="rId6"/>
           <a:stretch>
             <a:fillRect/>
           </a:stretch>
@@ -6571,7 +8416,7 @@
           <p:nvPr/>
         </p:nvPicPr>
         <p:blipFill>
-          <a:blip r:embed="rId6"/>
+          <a:blip r:embed="rId7"/>
           <a:stretch>
             <a:fillRect/>
           </a:stretch>
@@ -6601,7 +8446,7 @@
           <p:nvPr/>
         </p:nvPicPr>
         <p:blipFill>
-          <a:blip r:embed="rId7"/>
+          <a:blip r:embed="rId8"/>
           <a:stretch>
             <a:fillRect/>
           </a:stretch>
@@ -6631,7 +8476,7 @@
           <p:nvPr/>
         </p:nvPicPr>
         <p:blipFill>
-          <a:blip r:embed="rId8"/>
+          <a:blip r:embed="rId9"/>
           <a:stretch>
             <a:fillRect/>
           </a:stretch>
@@ -6661,7 +8506,7 @@
           <p:nvPr/>
         </p:nvPicPr>
         <p:blipFill>
-          <a:blip r:embed="rId9"/>
+          <a:blip r:embed="rId10"/>
           <a:stretch>
             <a:fillRect/>
           </a:stretch>
@@ -6691,7 +8536,7 @@
           <p:nvPr/>
         </p:nvPicPr>
         <p:blipFill>
-          <a:blip r:embed="rId2"/>
+          <a:blip r:embed="rId3"/>
           <a:stretch>
             <a:fillRect/>
           </a:stretch>
@@ -6721,7 +8566,7 @@
           <p:nvPr/>
         </p:nvPicPr>
         <p:blipFill>
-          <a:blip r:embed="rId10"/>
+          <a:blip r:embed="rId11"/>
           <a:stretch>
             <a:fillRect/>
           </a:stretch>
@@ -6751,7 +8596,7 @@
           <p:nvPr/>
         </p:nvPicPr>
         <p:blipFill>
-          <a:blip r:embed="rId11"/>
+          <a:blip r:embed="rId12"/>
           <a:stretch>
             <a:fillRect/>
           </a:stretch>
@@ -6781,7 +8626,7 @@
           <p:nvPr/>
         </p:nvPicPr>
         <p:blipFill>
-          <a:blip r:embed="rId12"/>
+          <a:blip r:embed="rId13"/>
           <a:stretch>
             <a:fillRect/>
           </a:stretch>
@@ -6811,7 +8656,7 @@
           <p:nvPr/>
         </p:nvPicPr>
         <p:blipFill>
-          <a:blip r:embed="rId13"/>
+          <a:blip r:embed="rId14"/>
           <a:stretch>
             <a:fillRect/>
           </a:stretch>
@@ -6876,7 +8721,7 @@
           <p:nvPr/>
         </p:nvPicPr>
         <p:blipFill>
-          <a:blip r:embed="rId14"/>
+          <a:blip r:embed="rId15"/>
           <a:stretch>
             <a:fillRect/>
           </a:stretch>
@@ -6906,7 +8751,7 @@
           <p:nvPr/>
         </p:nvPicPr>
         <p:blipFill>
-          <a:blip r:embed="rId15"/>
+          <a:blip r:embed="rId16"/>
           <a:stretch>
             <a:fillRect/>
           </a:stretch>
@@ -8226,4 +10071,299 @@
     </a:ext>
   </a:extLst>
 </a:theme>
+</file>
+
+<file path=ppt/theme/theme2.xml><?xml version="1.0" encoding="utf-8"?>
+<a:theme xmlns:a="http://schemas.openxmlformats.org/drawingml/2006/main" name="Office Theme">
+  <a:themeElements>
+    <a:clrScheme name="Office">
+      <a:dk1>
+        <a:sysClr val="windowText" lastClr="000000"/>
+      </a:dk1>
+      <a:lt1>
+        <a:sysClr val="window" lastClr="FFFFFF"/>
+      </a:lt1>
+      <a:dk2>
+        <a:srgbClr val="44546A"/>
+      </a:dk2>
+      <a:lt2>
+        <a:srgbClr val="E7E6E6"/>
+      </a:lt2>
+      <a:accent1>
+        <a:srgbClr val="4472C4"/>
+      </a:accent1>
+      <a:accent2>
+        <a:srgbClr val="ED7D31"/>
+      </a:accent2>
+      <a:accent3>
+        <a:srgbClr val="A5A5A5"/>
+      </a:accent3>
+      <a:accent4>
+        <a:srgbClr val="FFC000"/>
+      </a:accent4>
+      <a:accent5>
+        <a:srgbClr val="5B9BD5"/>
+      </a:accent5>
+      <a:accent6>
+        <a:srgbClr val="70AD47"/>
+      </a:accent6>
+      <a:hlink>
+        <a:srgbClr val="0563C1"/>
+      </a:hlink>
+      <a:folHlink>
+        <a:srgbClr val="954F72"/>
+      </a:folHlink>
+    </a:clrScheme>
+    <a:fontScheme name="Office">
+      <a:majorFont>
+        <a:latin typeface="Calibri Light" panose="020F0302020204030204"/>
+        <a:ea typeface=""/>
+        <a:cs typeface=""/>
+        <a:font script="Jpan" typeface="游ゴシック Light"/>
+        <a:font script="Hang" typeface="맑은 고딕"/>
+        <a:font script="Hans" typeface="等线 Light"/>
+        <a:font script="Hant" typeface="新細明體"/>
+        <a:font script="Arab" typeface="Times New Roman"/>
+        <a:font script="Hebr" typeface="Times New Roman"/>
+        <a:font script="Thai" typeface="Angsana New"/>
+        <a:font script="Ethi" typeface="Nyala"/>
+        <a:font script="Beng" typeface="Vrinda"/>
+        <a:font script="Gujr" typeface="Shruti"/>
+        <a:font script="Khmr" typeface="MoolBoran"/>
+        <a:font script="Knda" typeface="Tunga"/>
+        <a:font script="Guru" typeface="Raavi"/>
+        <a:font script="Cans" typeface="Euphemia"/>
+        <a:font script="Cher" typeface="Plantagenet Cherokee"/>
+        <a:font script="Yiii" typeface="Microsoft Yi Baiti"/>
+        <a:font script="Tibt" typeface="Microsoft Himalaya"/>
+        <a:font script="Thaa" typeface="MV Boli"/>
+        <a:font script="Deva" typeface="Mangal"/>
+        <a:font script="Telu" typeface="Gautami"/>
+        <a:font script="Taml" typeface="Latha"/>
+        <a:font script="Syrc" typeface="Estrangelo Edessa"/>
+        <a:font script="Orya" typeface="Kalinga"/>
+        <a:font script="Mlym" typeface="Kartika"/>
+        <a:font script="Laoo" typeface="DokChampa"/>
+        <a:font script="Sinh" typeface="Iskoola Pota"/>
+        <a:font script="Mong" typeface="Mongolian Baiti"/>
+        <a:font script="Viet" typeface="Times New Roman"/>
+        <a:font script="Uigh" typeface="Microsoft Uighur"/>
+        <a:font script="Geor" typeface="Sylfaen"/>
+        <a:font script="Armn" typeface="Arial"/>
+        <a:font script="Bugi" typeface="Leelawadee UI"/>
+        <a:font script="Bopo" typeface="Microsoft JhengHei"/>
+        <a:font script="Java" typeface="Javanese Text"/>
+        <a:font script="Lisu" typeface="Segoe UI"/>
+        <a:font script="Mymr" typeface="Myanmar Text"/>
+        <a:font script="Nkoo" typeface="Ebrima"/>
+        <a:font script="Olck" typeface="Nirmala UI"/>
+        <a:font script="Osma" typeface="Ebrima"/>
+        <a:font script="Phag" typeface="Phagspa"/>
+        <a:font script="Syrn" typeface="Estrangelo Edessa"/>
+        <a:font script="Syrj" typeface="Estrangelo Edessa"/>
+        <a:font script="Syre" typeface="Estrangelo Edessa"/>
+        <a:font script="Sora" typeface="Nirmala UI"/>
+        <a:font script="Tale" typeface="Microsoft Tai Le"/>
+        <a:font script="Talu" typeface="Microsoft New Tai Lue"/>
+        <a:font script="Tfng" typeface="Ebrima"/>
+      </a:majorFont>
+      <a:minorFont>
+        <a:latin typeface="Calibri" panose="020F0502020204030204"/>
+        <a:ea typeface=""/>
+        <a:cs typeface=""/>
+        <a:font script="Jpan" typeface="游ゴシック"/>
+        <a:font script="Hang" typeface="맑은 고딕"/>
+        <a:font script="Hans" typeface="等线"/>
+        <a:font script="Hant" typeface="新細明體"/>
+        <a:font script="Arab" typeface="Arial"/>
+        <a:font script="Hebr" typeface="Arial"/>
+        <a:font script="Thai" typeface="Cordia New"/>
+        <a:font script="Ethi" typeface="Nyala"/>
+        <a:font script="Beng" typeface="Vrinda"/>
+        <a:font script="Gujr" typeface="Shruti"/>
+        <a:font script="Khmr" typeface="DaunPenh"/>
+        <a:font script="Knda" typeface="Tunga"/>
+        <a:font script="Guru" typeface="Raavi"/>
+        <a:font script="Cans" typeface="Euphemia"/>
+        <a:font script="Cher" typeface="Plantagenet Cherokee"/>
+        <a:font script="Yiii" typeface="Microsoft Yi Baiti"/>
+        <a:font script="Tibt" typeface="Microsoft Himalaya"/>
+        <a:font script="Thaa" typeface="MV Boli"/>
+        <a:font script="Deva" typeface="Mangal"/>
+        <a:font script="Telu" typeface="Gautami"/>
+        <a:font script="Taml" typeface="Latha"/>
+        <a:font script="Syrc" typeface="Estrangelo Edessa"/>
+        <a:font script="Orya" typeface="Kalinga"/>
+        <a:font script="Mlym" typeface="Kartika"/>
+        <a:font script="Laoo" typeface="DokChampa"/>
+        <a:font script="Sinh" typeface="Iskoola Pota"/>
+        <a:font script="Mong" typeface="Mongolian Baiti"/>
+        <a:font script="Viet" typeface="Arial"/>
+        <a:font script="Uigh" typeface="Microsoft Uighur"/>
+        <a:font script="Geor" typeface="Sylfaen"/>
+        <a:font script="Armn" typeface="Arial"/>
+        <a:font script="Bugi" typeface="Leelawadee UI"/>
+        <a:font script="Bopo" typeface="Microsoft JhengHei"/>
+        <a:font script="Java" typeface="Javanese Text"/>
+        <a:font script="Lisu" typeface="Segoe UI"/>
+        <a:font script="Mymr" typeface="Myanmar Text"/>
+        <a:font script="Nkoo" typeface="Ebrima"/>
+        <a:font script="Olck" typeface="Nirmala UI"/>
+        <a:font script="Osma" typeface="Ebrima"/>
+        <a:font script="Phag" typeface="Phagspa"/>
+        <a:font script="Syrn" typeface="Estrangelo Edessa"/>
+        <a:font script="Syrj" typeface="Estrangelo Edessa"/>
+        <a:font script="Syre" typeface="Estrangelo Edessa"/>
+        <a:font script="Sora" typeface="Nirmala UI"/>
+        <a:font script="Tale" typeface="Microsoft Tai Le"/>
+        <a:font script="Talu" typeface="Microsoft New Tai Lue"/>
+        <a:font script="Tfng" typeface="Ebrima"/>
+      </a:minorFont>
+    </a:fontScheme>
+    <a:fmtScheme name="Office">
+      <a:fillStyleLst>
+        <a:solidFill>
+          <a:schemeClr val="phClr"/>
+        </a:solidFill>
+        <a:gradFill rotWithShape="1">
+          <a:gsLst>
+            <a:gs pos="0">
+              <a:schemeClr val="phClr">
+                <a:lumMod val="110000"/>
+                <a:satMod val="105000"/>
+                <a:tint val="67000"/>
+              </a:schemeClr>
+            </a:gs>
+            <a:gs pos="50000">
+              <a:schemeClr val="phClr">
+                <a:lumMod val="105000"/>
+                <a:satMod val="103000"/>
+                <a:tint val="73000"/>
+              </a:schemeClr>
+            </a:gs>
+            <a:gs pos="100000">
+              <a:schemeClr val="phClr">
+                <a:lumMod val="105000"/>
+                <a:satMod val="109000"/>
+                <a:tint val="81000"/>
+              </a:schemeClr>
+            </a:gs>
+          </a:gsLst>
+          <a:lin ang="5400000" scaled="0"/>
+        </a:gradFill>
+        <a:gradFill rotWithShape="1">
+          <a:gsLst>
+            <a:gs pos="0">
+              <a:schemeClr val="phClr">
+                <a:satMod val="103000"/>
+                <a:lumMod val="102000"/>
+                <a:tint val="94000"/>
+              </a:schemeClr>
+            </a:gs>
+            <a:gs pos="50000">
+              <a:schemeClr val="phClr">
+                <a:satMod val="110000"/>
+                <a:lumMod val="100000"/>
+                <a:shade val="100000"/>
+              </a:schemeClr>
+            </a:gs>
+            <a:gs pos="100000">
+              <a:schemeClr val="phClr">
+                <a:lumMod val="99000"/>
+                <a:satMod val="120000"/>
+                <a:shade val="78000"/>
+              </a:schemeClr>
+            </a:gs>
+          </a:gsLst>
+          <a:lin ang="5400000" scaled="0"/>
+        </a:gradFill>
+      </a:fillStyleLst>
+      <a:lnStyleLst>
+        <a:ln w="6350" cap="flat" cmpd="sng" algn="ctr">
+          <a:solidFill>
+            <a:schemeClr val="phClr"/>
+          </a:solidFill>
+          <a:prstDash val="solid"/>
+          <a:miter lim="800000"/>
+        </a:ln>
+        <a:ln w="12700" cap="flat" cmpd="sng" algn="ctr">
+          <a:solidFill>
+            <a:schemeClr val="phClr"/>
+          </a:solidFill>
+          <a:prstDash val="solid"/>
+          <a:miter lim="800000"/>
+        </a:ln>
+        <a:ln w="19050" cap="flat" cmpd="sng" algn="ctr">
+          <a:solidFill>
+            <a:schemeClr val="phClr"/>
+          </a:solidFill>
+          <a:prstDash val="solid"/>
+          <a:miter lim="800000"/>
+        </a:ln>
+      </a:lnStyleLst>
+      <a:effectStyleLst>
+        <a:effectStyle>
+          <a:effectLst/>
+        </a:effectStyle>
+        <a:effectStyle>
+          <a:effectLst/>
+        </a:effectStyle>
+        <a:effectStyle>
+          <a:effectLst>
+            <a:outerShdw blurRad="57150" dist="19050" dir="5400000" algn="ctr" rotWithShape="0">
+              <a:srgbClr val="000000">
+                <a:alpha val="63000"/>
+              </a:srgbClr>
+            </a:outerShdw>
+          </a:effectLst>
+        </a:effectStyle>
+      </a:effectStyleLst>
+      <a:bgFillStyleLst>
+        <a:solidFill>
+          <a:schemeClr val="phClr"/>
+        </a:solidFill>
+        <a:solidFill>
+          <a:schemeClr val="phClr">
+            <a:tint val="95000"/>
+            <a:satMod val="170000"/>
+          </a:schemeClr>
+        </a:solidFill>
+        <a:gradFill rotWithShape="1">
+          <a:gsLst>
+            <a:gs pos="0">
+              <a:schemeClr val="phClr">
+                <a:tint val="93000"/>
+                <a:satMod val="150000"/>
+                <a:shade val="98000"/>
+                <a:lumMod val="102000"/>
+              </a:schemeClr>
+            </a:gs>
+            <a:gs pos="50000">
+              <a:schemeClr val="phClr">
+                <a:tint val="98000"/>
+                <a:satMod val="130000"/>
+                <a:shade val="90000"/>
+                <a:lumMod val="103000"/>
+              </a:schemeClr>
+            </a:gs>
+            <a:gs pos="100000">
+              <a:schemeClr val="phClr">
+                <a:shade val="63000"/>
+                <a:satMod val="120000"/>
+              </a:schemeClr>
+            </a:gs>
+          </a:gsLst>
+          <a:lin ang="5400000" scaled="0"/>
+        </a:gradFill>
+      </a:bgFillStyleLst>
+    </a:fmtScheme>
+  </a:themeElements>
+  <a:objectDefaults/>
+  <a:extraClrSchemeLst/>
+  <a:extLst>
+    <a:ext uri="{05A4C25C-085E-4340-85A3-A5531E510DB2}">
+      <thm15:themeFamily xmlns:thm15="http://schemas.microsoft.com/office/thememl/2012/main" name="Office Theme" id="{62F939B6-93AF-4DB8-9C6B-D6C7DFDC589F}" vid="{4A3C46E8-61CC-4603-A589-7422A47A8E4A}"/>
+    </a:ext>
+  </a:extLst>
+</a:theme>
 </file>
</xml_diff>